<commit_message>
in Portfolio Reports:  Current Constellation aufgenommen ; Erkennung "istRollenDiagramm", "istKostenDiagramm" etc auf chtobjName Kennung hin angepasst; BubbleChart Diagramme werden std-mäßig immer mit Ampel-Farbe (nihct mehr Projekt-Farbe) angezeigt
</commit_message>
<xml_diff>
--- a/Projectboard/Projectboard/bin/Debug/requirements/ReportTemplatesProject/Summary.pptx
+++ b/Projectboard/Projectboard/bin/Debug/requirements/ReportTemplatesProject/Summary.pptx
@@ -533,587 +533,1378 @@
           <a:lstStyle/>
           <a:p>
             <a:r>
-              <a:rPr lang="de-DE" sz="2500" dirty="0" smtClean="0"/>
+              <a:rPr lang="de-DE" sz="2800" kern="1200" dirty="0" smtClean="0">
+                <a:solidFill>
+                  <a:srgbClr val="572E2D"/>
+                </a:solidFill>
+                <a:latin typeface="Noteworthy Bold" charset="0"/>
+                <a:ea typeface="Noteworthy Bold" charset="0"/>
+                <a:cs typeface="Noteworthy Bold" charset="0"/>
+                <a:sym typeface="Noteworthy Bold" charset="0"/>
+              </a:rPr>
               <a:t>Projekt-Name</a:t>
             </a:r>
           </a:p>
           <a:p>
             <a:r>
-              <a:rPr lang="de-DE" sz="2500" dirty="0" smtClean="0"/>
+              <a:rPr lang="de-DE" sz="2800" kern="1200" dirty="0" smtClean="0">
+                <a:solidFill>
+                  <a:srgbClr val="572E2D"/>
+                </a:solidFill>
+                <a:latin typeface="Noteworthy Bold" charset="0"/>
+                <a:ea typeface="Noteworthy Bold" charset="0"/>
+                <a:cs typeface="Noteworthy Bold" charset="0"/>
+                <a:sym typeface="Noteworthy Bold" charset="0"/>
+              </a:rPr>
+              <a:t>Soll-Ist &amp; Prognose</a:t>
+            </a:r>
+          </a:p>
+          <a:p>
+            <a:r>
+              <a:rPr lang="de-DE" sz="2800" kern="1200" dirty="0" smtClean="0">
+                <a:solidFill>
+                  <a:srgbClr val="572E2D"/>
+                </a:solidFill>
+                <a:latin typeface="Noteworthy Bold" charset="0"/>
+                <a:ea typeface="Noteworthy Bold" charset="0"/>
+                <a:cs typeface="Noteworthy Bold" charset="0"/>
+                <a:sym typeface="Noteworthy Bold" charset="0"/>
+              </a:rPr>
+              <a:t>Projekt-Grafik</a:t>
+            </a:r>
+          </a:p>
+          <a:p>
+            <a:r>
+              <a:rPr lang="de-DE" sz="2800" kern="1200" dirty="0" smtClean="0">
+                <a:solidFill>
+                  <a:srgbClr val="572E2D"/>
+                </a:solidFill>
+                <a:latin typeface="Noteworthy Bold" charset="0"/>
+                <a:ea typeface="Noteworthy Bold" charset="0"/>
+                <a:cs typeface="Noteworthy Bold" charset="0"/>
+                <a:sym typeface="Noteworthy Bold" charset="0"/>
+              </a:rPr>
+              <a:t>Meilenstein Trendanalyse</a:t>
+            </a:r>
+          </a:p>
+          <a:p>
+            <a:r>
+              <a:rPr lang="de-DE" sz="2800" kern="1200" dirty="0" smtClean="0">
+                <a:solidFill>
+                  <a:srgbClr val="572E2D"/>
+                </a:solidFill>
+                <a:latin typeface="Noteworthy Bold" charset="0"/>
+                <a:ea typeface="Noteworthy Bold" charset="0"/>
+                <a:cs typeface="Noteworthy Bold" charset="0"/>
+                <a:sym typeface="Noteworthy Bold" charset="0"/>
+              </a:rPr>
+              <a:t>Vergleich mit Beauftragung</a:t>
+            </a:r>
+          </a:p>
+          <a:p>
+            <a:r>
+              <a:rPr lang="de-DE" sz="2800" kern="1200" dirty="0" smtClean="0">
+                <a:solidFill>
+                  <a:srgbClr val="572E2D"/>
+                </a:solidFill>
+                <a:latin typeface="Noteworthy Bold" charset="0"/>
+                <a:ea typeface="Noteworthy Bold" charset="0"/>
+                <a:cs typeface="Noteworthy Bold" charset="0"/>
+                <a:sym typeface="Noteworthy Bold" charset="0"/>
+              </a:rPr>
+              <a:t>Vergleich mit letztem Stand</a:t>
+            </a:r>
+          </a:p>
+          <a:p>
+            <a:r>
+              <a:rPr lang="de-DE" sz="2800" kern="1200" dirty="0" smtClean="0">
+                <a:solidFill>
+                  <a:srgbClr val="572E2D"/>
+                </a:solidFill>
+                <a:latin typeface="Noteworthy Bold" charset="0"/>
+                <a:ea typeface="Noteworthy Bold" charset="0"/>
+                <a:cs typeface="Noteworthy Bold" charset="0"/>
+                <a:sym typeface="Noteworthy Bold" charset="0"/>
+              </a:rPr>
+              <a:t>Vergleich mit Vorlage</a:t>
+            </a:r>
+          </a:p>
+          <a:p>
+            <a:r>
+              <a:rPr lang="de-DE" sz="2800" kern="1200" dirty="0" smtClean="0">
+                <a:solidFill>
+                  <a:srgbClr val="572E2D"/>
+                </a:solidFill>
+                <a:latin typeface="Noteworthy Bold" charset="0"/>
+                <a:ea typeface="Noteworthy Bold" charset="0"/>
+                <a:cs typeface="Noteworthy Bold" charset="0"/>
+                <a:sym typeface="Noteworthy Bold" charset="0"/>
+              </a:rPr>
+              <a:t>Tabelle Projektziele</a:t>
+            </a:r>
+          </a:p>
+          <a:p>
+            <a:r>
+              <a:rPr lang="de-DE" sz="2800" kern="1200" dirty="0" smtClean="0">
+                <a:solidFill>
+                  <a:srgbClr val="572E2D"/>
+                </a:solidFill>
+                <a:latin typeface="Noteworthy Bold" charset="0"/>
+                <a:ea typeface="Noteworthy Bold" charset="0"/>
+                <a:cs typeface="Noteworthy Bold" charset="0"/>
+                <a:sym typeface="Noteworthy Bold" charset="0"/>
+              </a:rPr>
+              <a:t>Tabelle Projektstatus</a:t>
+            </a:r>
+          </a:p>
+          <a:p>
+            <a:r>
+              <a:rPr lang="de-DE" sz="2800" kern="1200" dirty="0" smtClean="0">
+                <a:solidFill>
+                  <a:srgbClr val="572E2D"/>
+                </a:solidFill>
+                <a:latin typeface="Noteworthy Bold" charset="0"/>
+                <a:ea typeface="Noteworthy Bold" charset="0"/>
+                <a:cs typeface="Noteworthy Bold" charset="0"/>
+                <a:sym typeface="Noteworthy Bold" charset="0"/>
+              </a:rPr>
+              <a:t>Tabelle Veränderungen</a:t>
+            </a:r>
+          </a:p>
+          <a:p>
+            <a:r>
+              <a:rPr lang="de-DE" sz="2800" kern="1200" dirty="0" smtClean="0">
+                <a:solidFill>
+                  <a:srgbClr val="572E2D"/>
+                </a:solidFill>
+                <a:latin typeface="Noteworthy Bold" charset="0"/>
+                <a:ea typeface="Noteworthy Bold" charset="0"/>
+                <a:cs typeface="Noteworthy Bold" charset="0"/>
+                <a:sym typeface="Noteworthy Bold" charset="0"/>
+              </a:rPr>
+              <a:t>Tabelle Vergleich letzter Stand</a:t>
+            </a:r>
+          </a:p>
+          <a:p>
+            <a:r>
+              <a:rPr lang="de-DE" sz="2800" kern="1200" dirty="0" smtClean="0">
+                <a:solidFill>
+                  <a:srgbClr val="572E2D"/>
+                </a:solidFill>
+                <a:latin typeface="Noteworthy Bold" charset="0"/>
+                <a:ea typeface="Noteworthy Bold" charset="0"/>
+                <a:cs typeface="Noteworthy Bold" charset="0"/>
+                <a:sym typeface="Noteworthy Bold" charset="0"/>
+              </a:rPr>
+              <a:t>Tabelle Vergleich Beauftragung</a:t>
+            </a:r>
+          </a:p>
+          <a:p>
+            <a:r>
+              <a:rPr lang="de-DE" sz="2800" kern="1200" dirty="0" smtClean="0">
+                <a:solidFill>
+                  <a:srgbClr val="572E2D"/>
+                </a:solidFill>
+                <a:latin typeface="Noteworthy Bold" charset="0"/>
+                <a:ea typeface="Noteworthy Bold" charset="0"/>
+                <a:cs typeface="Noteworthy Bold" charset="0"/>
+                <a:sym typeface="Noteworthy Bold" charset="0"/>
+              </a:rPr>
               <a:t>Ergebnis</a:t>
             </a:r>
           </a:p>
           <a:p>
             <a:r>
-              <a:rPr lang="de-DE" sz="2500" dirty="0" smtClean="0"/>
+              <a:rPr lang="de-DE" sz="2800" kern="1200" dirty="0" smtClean="0">
+                <a:solidFill>
+                  <a:srgbClr val="572E2D"/>
+                </a:solidFill>
+                <a:latin typeface="Noteworthy Bold" charset="0"/>
+                <a:ea typeface="Noteworthy Bold" charset="0"/>
+                <a:cs typeface="Noteworthy Bold" charset="0"/>
+                <a:sym typeface="Noteworthy Bold" charset="0"/>
+              </a:rPr>
               <a:t>Strategie/Risiko</a:t>
             </a:r>
           </a:p>
           <a:p>
             <a:r>
-              <a:rPr lang="de-DE" sz="2500" dirty="0" smtClean="0"/>
+              <a:rPr lang="de-DE" sz="2800" kern="1200" dirty="0" smtClean="0">
+                <a:solidFill>
+                  <a:srgbClr val="572E2D"/>
+                </a:solidFill>
+                <a:latin typeface="Noteworthy Bold" charset="0"/>
+                <a:ea typeface="Noteworthy Bold" charset="0"/>
+                <a:cs typeface="Noteworthy Bold" charset="0"/>
+                <a:sym typeface="Noteworthy Bold" charset="0"/>
+              </a:rPr>
               <a:t>Teilprojekte</a:t>
             </a:r>
           </a:p>
           <a:p>
             <a:r>
-              <a:rPr lang="de-DE" sz="2500" dirty="0" smtClean="0"/>
+              <a:rPr lang="de-DE" sz="2800" kern="1200" dirty="0" smtClean="0">
+                <a:solidFill>
+                  <a:srgbClr val="572E2D"/>
+                </a:solidFill>
+                <a:latin typeface="Noteworthy Bold" charset="0"/>
+                <a:ea typeface="Noteworthy Bold" charset="0"/>
+                <a:cs typeface="Noteworthy Bold" charset="0"/>
+                <a:sym typeface="Noteworthy Bold" charset="0"/>
+              </a:rPr>
               <a:t>Personalbedarf</a:t>
             </a:r>
           </a:p>
           <a:p>
             <a:r>
-              <a:rPr lang="de-DE" sz="2500" dirty="0" smtClean="0"/>
+              <a:rPr lang="de-DE" sz="2800" kern="1200" dirty="0" smtClean="0">
+                <a:solidFill>
+                  <a:srgbClr val="572E2D"/>
+                </a:solidFill>
+                <a:latin typeface="Noteworthy Bold" charset="0"/>
+                <a:ea typeface="Noteworthy Bold" charset="0"/>
+                <a:cs typeface="Noteworthy Bold" charset="0"/>
+                <a:sym typeface="Noteworthy Bold" charset="0"/>
+              </a:rPr>
               <a:t>Personalkosten</a:t>
             </a:r>
           </a:p>
           <a:p>
             <a:r>
-              <a:rPr lang="de-DE" sz="2500" dirty="0" smtClean="0"/>
+              <a:rPr lang="de-DE" sz="2800" kern="1200" dirty="0" smtClean="0">
+                <a:solidFill>
+                  <a:srgbClr val="572E2D"/>
+                </a:solidFill>
+                <a:latin typeface="Noteworthy Bold" charset="0"/>
+                <a:ea typeface="Noteworthy Bold" charset="0"/>
+                <a:cs typeface="Noteworthy Bold" charset="0"/>
+                <a:sym typeface="Noteworthy Bold" charset="0"/>
+              </a:rPr>
               <a:t>Sonstige Kosten</a:t>
             </a:r>
           </a:p>
           <a:p>
             <a:r>
-              <a:rPr lang="de-DE" sz="2500" dirty="0" smtClean="0"/>
+              <a:rPr lang="de-DE" sz="2800" kern="1200" dirty="0" smtClean="0">
+                <a:solidFill>
+                  <a:srgbClr val="572E2D"/>
+                </a:solidFill>
+                <a:latin typeface="Noteworthy Bold" charset="0"/>
+                <a:ea typeface="Noteworthy Bold" charset="0"/>
+                <a:cs typeface="Noteworthy Bold" charset="0"/>
+                <a:sym typeface="Noteworthy Bold" charset="0"/>
+              </a:rPr>
               <a:t>Gesamtkosten</a:t>
             </a:r>
           </a:p>
           <a:p>
-            <a:endParaRPr lang="de-DE" sz="2500" dirty="0" smtClean="0"/>
-          </a:p>
-          <a:p>
-            <a:pPr marL="0" marR="0" indent="0" algn="l" defTabSz="457200" rtl="0" eaLnBrk="1" fontAlgn="base" latinLnBrk="0" hangingPunct="0">
-              <a:lnSpc>
-                <a:spcPts val="3500"/>
-              </a:lnSpc>
-              <a:spcBef>
-                <a:spcPct val="0"/>
-              </a:spcBef>
-              <a:spcAft>
-                <a:spcPct val="0"/>
-              </a:spcAft>
-              <a:buClrTx/>
-              <a:buSzTx/>
-              <a:buFontTx/>
-              <a:buNone/>
-              <a:tabLst/>
-              <a:defRPr/>
-            </a:pPr>
-            <a:r>
-              <a:rPr kumimoji="0" lang="de-DE" sz="2800" b="0" i="0" u="none" strike="noStrike" cap="none" normalizeH="0" baseline="0" dirty="0" smtClean="0">
-                <a:ln>
-                  <a:noFill/>
-                </a:ln>
-                <a:solidFill>
-                  <a:schemeClr val="bg2"/>
+            <a:r>
+              <a:rPr lang="de-DE" sz="2800" kern="1200" dirty="0" smtClean="0">
+                <a:solidFill>
+                  <a:srgbClr val="572E2D"/>
+                </a:solidFill>
+                <a:latin typeface="Noteworthy Bold" charset="0"/>
+                <a:ea typeface="Noteworthy Bold" charset="0"/>
+                <a:cs typeface="Noteworthy Bold" charset="0"/>
+                <a:sym typeface="Noteworthy Bold" charset="0"/>
+              </a:rPr>
+              <a:t>Trend Strategischer Fit/Risiko</a:t>
+            </a:r>
+          </a:p>
+          <a:p>
+            <a:r>
+              <a:rPr lang="de-DE" sz="2800" kern="1200" dirty="0" smtClean="0">
+                <a:solidFill>
+                  <a:srgbClr val="572E2D"/>
+                </a:solidFill>
+                <a:latin typeface="Noteworthy Bold" charset="0"/>
+                <a:ea typeface="Noteworthy Bold" charset="0"/>
+                <a:cs typeface="Noteworthy Bold" charset="0"/>
+                <a:sym typeface="Noteworthy Bold" charset="0"/>
+              </a:rPr>
+              <a:t>Trend Kennzahlen</a:t>
+            </a:r>
+          </a:p>
+          <a:p>
+            <a:r>
+              <a:rPr lang="de-DE" sz="2800" kern="1200" dirty="0" smtClean="0">
+                <a:solidFill>
+                  <a:srgbClr val="572E2D"/>
+                </a:solidFill>
+                <a:latin typeface="Noteworthy Bold" charset="0"/>
+                <a:ea typeface="Noteworthy Bold" charset="0"/>
+                <a:cs typeface="Noteworthy Bold" charset="0"/>
+                <a:sym typeface="Noteworthy Bold" charset="0"/>
+              </a:rPr>
+              <a:t>Fortschritt Personalkosten</a:t>
+            </a:r>
+          </a:p>
+          <a:p>
+            <a:r>
+              <a:rPr lang="de-DE" sz="2800" kern="1200" dirty="0" smtClean="0">
+                <a:solidFill>
+                  <a:srgbClr val="572E2D"/>
+                </a:solidFill>
+                <a:latin typeface="Noteworthy Bold" charset="0"/>
+                <a:ea typeface="Noteworthy Bold" charset="0"/>
+                <a:cs typeface="Noteworthy Bold" charset="0"/>
+                <a:sym typeface="Noteworthy Bold" charset="0"/>
+              </a:rPr>
+              <a:t>Fortschritt Sonstige Kosten</a:t>
+            </a:r>
+          </a:p>
+          <a:p>
+            <a:r>
+              <a:rPr lang="de-DE" sz="2800" kern="1200" dirty="0" smtClean="0">
+                <a:solidFill>
+                  <a:srgbClr val="572E2D"/>
+                </a:solidFill>
+                <a:latin typeface="Noteworthy Bold" charset="0"/>
+                <a:ea typeface="Noteworthy Bold" charset="0"/>
+                <a:cs typeface="Noteworthy Bold" charset="0"/>
+                <a:sym typeface="Noteworthy Bold" charset="0"/>
+              </a:rPr>
+              <a:t>Fortschritt Rolle(..)</a:t>
+            </a:r>
+          </a:p>
+          <a:p>
+            <a:r>
+              <a:rPr lang="de-DE" sz="2800" kern="1200" dirty="0" smtClean="0">
+                <a:solidFill>
+                  <a:srgbClr val="572E2D"/>
+                </a:solidFill>
+                <a:latin typeface="Noteworthy Bold" charset="0"/>
+                <a:ea typeface="Noteworthy Bold" charset="0"/>
+                <a:cs typeface="Noteworthy Bold" charset="0"/>
+                <a:sym typeface="Noteworthy Bold" charset="0"/>
+              </a:rPr>
+              <a:t>Fortschritt Kostenart(..)</a:t>
+            </a:r>
+          </a:p>
+          <a:p>
+            <a:r>
+              <a:rPr lang="de-DE" sz="2800" kern="1200" dirty="0" smtClean="0">
+                <a:solidFill>
+                  <a:srgbClr val="572E2D"/>
+                </a:solidFill>
+                <a:latin typeface="Noteworthy Bold" charset="0"/>
+                <a:ea typeface="Noteworthy Bold" charset="0"/>
+                <a:cs typeface="Noteworthy Bold" charset="0"/>
+                <a:sym typeface="Noteworthy Bold" charset="0"/>
+              </a:rPr>
+              <a:t>Soll-Ist1 Personalkosten</a:t>
+            </a:r>
+          </a:p>
+          <a:p>
+            <a:r>
+              <a:rPr lang="de-DE" sz="2800" kern="1200" dirty="0" smtClean="0">
+                <a:solidFill>
+                  <a:srgbClr val="572E2D"/>
+                </a:solidFill>
+                <a:latin typeface="Noteworthy Bold" charset="0"/>
+                <a:ea typeface="Noteworthy Bold" charset="0"/>
+                <a:cs typeface="Noteworthy Bold" charset="0"/>
+                <a:sym typeface="Noteworthy Bold" charset="0"/>
+              </a:rPr>
+              <a:t>Soll-Ist2 Personalkosten</a:t>
+            </a:r>
+          </a:p>
+          <a:p>
+            <a:r>
+              <a:rPr lang="de-DE" sz="2800" kern="1200" dirty="0" smtClean="0">
+                <a:solidFill>
+                  <a:srgbClr val="572E2D"/>
+                </a:solidFill>
+                <a:latin typeface="Noteworthy Bold" charset="0"/>
+                <a:ea typeface="Noteworthy Bold" charset="0"/>
+                <a:cs typeface="Noteworthy Bold" charset="0"/>
+                <a:sym typeface="Noteworthy Bold" charset="0"/>
+              </a:rPr>
+              <a:t>Soll-Ist1C Personalkosten</a:t>
+            </a:r>
+          </a:p>
+          <a:p>
+            <a:r>
+              <a:rPr lang="de-DE" sz="2800" kern="1200" dirty="0" smtClean="0">
+                <a:solidFill>
+                  <a:srgbClr val="572E2D"/>
+                </a:solidFill>
+                <a:latin typeface="Noteworthy Bold" charset="0"/>
+                <a:ea typeface="Noteworthy Bold" charset="0"/>
+                <a:cs typeface="Noteworthy Bold" charset="0"/>
+                <a:sym typeface="Noteworthy Bold" charset="0"/>
+              </a:rPr>
+              <a:t>Soll-Ist2C Personalkosten</a:t>
+            </a:r>
+          </a:p>
+          <a:p>
+            <a:r>
+              <a:rPr lang="de-DE" sz="2800" kern="1200" dirty="0" smtClean="0">
+                <a:solidFill>
+                  <a:srgbClr val="572E2D"/>
+                </a:solidFill>
+                <a:latin typeface="Noteworthy Bold" charset="0"/>
+                <a:ea typeface="Noteworthy Bold" charset="0"/>
+                <a:cs typeface="Noteworthy Bold" charset="0"/>
+                <a:sym typeface="Noteworthy Bold" charset="0"/>
+              </a:rPr>
+              <a:t>Soll-Ist1 Sonstige Kosten</a:t>
+            </a:r>
+          </a:p>
+          <a:p>
+            <a:r>
+              <a:rPr lang="de-DE" sz="2800" kern="1200" dirty="0" smtClean="0">
+                <a:solidFill>
+                  <a:srgbClr val="572E2D"/>
+                </a:solidFill>
+                <a:latin typeface="Noteworthy Bold" charset="0"/>
+                <a:ea typeface="Noteworthy Bold" charset="0"/>
+                <a:cs typeface="Noteworthy Bold" charset="0"/>
+                <a:sym typeface="Noteworthy Bold" charset="0"/>
+              </a:rPr>
+              <a:t>Soll-Ist2 Sonstige Kosten</a:t>
+            </a:r>
+          </a:p>
+          <a:p>
+            <a:r>
+              <a:rPr lang="de-DE" sz="2800" kern="1200" dirty="0" smtClean="0">
+                <a:solidFill>
+                  <a:srgbClr val="572E2D"/>
+                </a:solidFill>
+                <a:latin typeface="Noteworthy Bold" charset="0"/>
+                <a:ea typeface="Noteworthy Bold" charset="0"/>
+                <a:cs typeface="Noteworthy Bold" charset="0"/>
+                <a:sym typeface="Noteworthy Bold" charset="0"/>
+              </a:rPr>
+              <a:t>Soll-Ist1C Sonstige Kosten</a:t>
+            </a:r>
+          </a:p>
+          <a:p>
+            <a:r>
+              <a:rPr lang="de-DE" sz="2800" kern="1200" dirty="0" smtClean="0">
+                <a:solidFill>
+                  <a:srgbClr val="572E2D"/>
+                </a:solidFill>
+                <a:latin typeface="Noteworthy Bold" charset="0"/>
+                <a:ea typeface="Noteworthy Bold" charset="0"/>
+                <a:cs typeface="Noteworthy Bold" charset="0"/>
+                <a:sym typeface="Noteworthy Bold" charset="0"/>
+              </a:rPr>
+              <a:t>Soll-Ist2C Sonstige Kosten</a:t>
+            </a:r>
+          </a:p>
+          <a:p>
+            <a:r>
+              <a:rPr lang="de-DE" sz="2800" kern="1200" dirty="0" smtClean="0">
+                <a:solidFill>
+                  <a:srgbClr val="572E2D"/>
+                </a:solidFill>
+                <a:latin typeface="Noteworthy Bold" charset="0"/>
+                <a:ea typeface="Noteworthy Bold" charset="0"/>
+                <a:cs typeface="Noteworthy Bold" charset="0"/>
+                <a:sym typeface="Noteworthy Bold" charset="0"/>
+              </a:rPr>
+              <a:t>Soll-Ist1 Gesamtkosten</a:t>
+            </a:r>
+          </a:p>
+          <a:p>
+            <a:r>
+              <a:rPr lang="de-DE" sz="2800" kern="1200" dirty="0" smtClean="0">
+                <a:solidFill>
+                  <a:srgbClr val="572E2D"/>
+                </a:solidFill>
+                <a:latin typeface="Noteworthy Bold" charset="0"/>
+                <a:ea typeface="Noteworthy Bold" charset="0"/>
+                <a:cs typeface="Noteworthy Bold" charset="0"/>
+                <a:sym typeface="Noteworthy Bold" charset="0"/>
+              </a:rPr>
+              <a:t>Soll-Ist2 Gesamtkosten</a:t>
+            </a:r>
+          </a:p>
+          <a:p>
+            <a:r>
+              <a:rPr lang="de-DE" sz="2800" kern="1200" dirty="0" smtClean="0">
+                <a:solidFill>
+                  <a:srgbClr val="572E2D"/>
+                </a:solidFill>
+                <a:latin typeface="Noteworthy Bold" charset="0"/>
+                <a:ea typeface="Noteworthy Bold" charset="0"/>
+                <a:cs typeface="Noteworthy Bold" charset="0"/>
+                <a:sym typeface="Noteworthy Bold" charset="0"/>
+              </a:rPr>
+              <a:t>Soll-Ist1C Gesamtkosten</a:t>
+            </a:r>
+          </a:p>
+          <a:p>
+            <a:r>
+              <a:rPr lang="de-DE" sz="2800" kern="1200" dirty="0" smtClean="0">
+                <a:solidFill>
+                  <a:srgbClr val="572E2D"/>
+                </a:solidFill>
+                <a:latin typeface="Noteworthy Bold" charset="0"/>
+                <a:ea typeface="Noteworthy Bold" charset="0"/>
+                <a:cs typeface="Noteworthy Bold" charset="0"/>
+                <a:sym typeface="Noteworthy Bold" charset="0"/>
+              </a:rPr>
+              <a:t>Soll-Ist2C Gesamtkosten</a:t>
+            </a:r>
+          </a:p>
+          <a:p>
+            <a:r>
+              <a:rPr lang="de-DE" sz="2800" kern="1200" dirty="0" smtClean="0">
+                <a:solidFill>
+                  <a:srgbClr val="572E2D"/>
+                </a:solidFill>
+                <a:latin typeface="Noteworthy Bold" charset="0"/>
+                <a:ea typeface="Noteworthy Bold" charset="0"/>
+                <a:cs typeface="Noteworthy Bold" charset="0"/>
+                <a:sym typeface="Noteworthy Bold" charset="0"/>
+              </a:rPr>
+              <a:t>Soll-Ist1 Rolle</a:t>
+            </a:r>
+          </a:p>
+          <a:p>
+            <a:r>
+              <a:rPr lang="de-DE" sz="2800" kern="1200" dirty="0" smtClean="0">
+                <a:solidFill>
+                  <a:srgbClr val="572E2D"/>
+                </a:solidFill>
+                <a:latin typeface="Noteworthy Bold" charset="0"/>
+                <a:ea typeface="Noteworthy Bold" charset="0"/>
+                <a:cs typeface="Noteworthy Bold" charset="0"/>
+                <a:sym typeface="Noteworthy Bold" charset="0"/>
+              </a:rPr>
+              <a:t>Soll-Ist2 Rolle</a:t>
+            </a:r>
+          </a:p>
+          <a:p>
+            <a:r>
+              <a:rPr lang="de-DE" sz="2800" kern="1200" dirty="0" smtClean="0">
+                <a:solidFill>
+                  <a:srgbClr val="572E2D"/>
+                </a:solidFill>
+                <a:latin typeface="Noteworthy Bold" charset="0"/>
+                <a:ea typeface="Noteworthy Bold" charset="0"/>
+                <a:cs typeface="Noteworthy Bold" charset="0"/>
+                <a:sym typeface="Noteworthy Bold" charset="0"/>
+              </a:rPr>
+              <a:t>Soll-Ist1C Rolle</a:t>
+            </a:r>
+          </a:p>
+          <a:p>
+            <a:r>
+              <a:rPr lang="de-DE" sz="2800" kern="1200" dirty="0" smtClean="0">
+                <a:solidFill>
+                  <a:srgbClr val="572E2D"/>
+                </a:solidFill>
+                <a:latin typeface="Noteworthy Bold" charset="0"/>
+                <a:ea typeface="Noteworthy Bold" charset="0"/>
+                <a:cs typeface="Noteworthy Bold" charset="0"/>
+                <a:sym typeface="Noteworthy Bold" charset="0"/>
+              </a:rPr>
+              <a:t>Soll-Ist2C Rolle</a:t>
+            </a:r>
+          </a:p>
+          <a:p>
+            <a:r>
+              <a:rPr lang="de-DE" sz="2800" kern="1200" dirty="0" smtClean="0">
+                <a:solidFill>
+                  <a:srgbClr val="572E2D"/>
+                </a:solidFill>
+                <a:latin typeface="Noteworthy Bold" charset="0"/>
+                <a:ea typeface="Noteworthy Bold" charset="0"/>
+                <a:cs typeface="Noteworthy Bold" charset="0"/>
+                <a:sym typeface="Noteworthy Bold" charset="0"/>
+              </a:rPr>
+              <a:t>Soll-Ist1 Kostenart</a:t>
+            </a:r>
+          </a:p>
+          <a:p>
+            <a:r>
+              <a:rPr lang="de-DE" sz="2800" kern="1200" dirty="0" smtClean="0">
+                <a:solidFill>
+                  <a:srgbClr val="572E2D"/>
+                </a:solidFill>
+                <a:latin typeface="Noteworthy Bold" charset="0"/>
+                <a:ea typeface="Noteworthy Bold" charset="0"/>
+                <a:cs typeface="Noteworthy Bold" charset="0"/>
+                <a:sym typeface="Noteworthy Bold" charset="0"/>
+              </a:rPr>
+              <a:t>Soll-Ist2 Kostenart</a:t>
+            </a:r>
+          </a:p>
+          <a:p>
+            <a:r>
+              <a:rPr lang="de-DE" sz="2800" kern="1200" dirty="0" smtClean="0">
+                <a:solidFill>
+                  <a:srgbClr val="572E2D"/>
+                </a:solidFill>
+                <a:latin typeface="Noteworthy Bold" charset="0"/>
+                <a:ea typeface="Noteworthy Bold" charset="0"/>
+                <a:cs typeface="Noteworthy Bold" charset="0"/>
+                <a:sym typeface="Noteworthy Bold" charset="0"/>
+              </a:rPr>
+              <a:t>Soll-Ist1C Kostenart</a:t>
+            </a:r>
+          </a:p>
+          <a:p>
+            <a:r>
+              <a:rPr lang="de-DE" sz="2800" kern="1200" dirty="0" smtClean="0">
+                <a:solidFill>
+                  <a:srgbClr val="572E2D"/>
+                </a:solidFill>
+                <a:latin typeface="Noteworthy Bold" charset="0"/>
+                <a:ea typeface="Noteworthy Bold" charset="0"/>
+                <a:cs typeface="Noteworthy Bold" charset="0"/>
+                <a:sym typeface="Noteworthy Bold" charset="0"/>
+              </a:rPr>
+              <a:t>Soll-Ist2C Kostenart</a:t>
+            </a:r>
+          </a:p>
+          <a:p>
+            <a:r>
+              <a:rPr lang="de-DE" sz="2800" kern="1200" dirty="0" smtClean="0">
+                <a:solidFill>
+                  <a:srgbClr val="572E2D"/>
+                </a:solidFill>
+                <a:latin typeface="Noteworthy Bold" charset="0"/>
+                <a:ea typeface="Noteworthy Bold" charset="0"/>
+                <a:cs typeface="Noteworthy Bold" charset="0"/>
+                <a:sym typeface="Noteworthy Bold" charset="0"/>
+              </a:rPr>
+              <a:t>Ampel-Farbe</a:t>
+            </a:r>
+          </a:p>
+          <a:p>
+            <a:r>
+              <a:rPr lang="de-DE" sz="2800" kern="1200" dirty="0" smtClean="0">
+                <a:solidFill>
+                  <a:srgbClr val="572E2D"/>
+                </a:solidFill>
+                <a:latin typeface="Noteworthy Bold" charset="0"/>
+                <a:ea typeface="Noteworthy Bold" charset="0"/>
+                <a:cs typeface="Noteworthy Bold" charset="0"/>
+                <a:sym typeface="Noteworthy Bold" charset="0"/>
+              </a:rPr>
+              <a:t>Beschreibung</a:t>
+            </a:r>
+          </a:p>
+          <a:p>
+            <a:r>
+              <a:rPr lang="de-DE" sz="2800" kern="1200" dirty="0" smtClean="0">
+                <a:solidFill>
+                  <a:srgbClr val="572E2D"/>
+                </a:solidFill>
+                <a:latin typeface="Noteworthy Bold" charset="0"/>
+                <a:ea typeface="Noteworthy Bold" charset="0"/>
+                <a:cs typeface="Noteworthy Bold" charset="0"/>
+                <a:sym typeface="Noteworthy Bold" charset="0"/>
+              </a:rPr>
+              <a:t>Stand:</a:t>
+            </a:r>
+          </a:p>
+          <a:p>
+            <a:r>
+              <a:rPr lang="de-DE" sz="2800" kern="1200" dirty="0" smtClean="0">
+                <a:solidFill>
+                  <a:srgbClr val="572E2D"/>
+                </a:solidFill>
+                <a:latin typeface="Noteworthy Bold" charset="0"/>
+                <a:ea typeface="Noteworthy Bold" charset="0"/>
+                <a:cs typeface="Noteworthy Bold" charset="0"/>
+                <a:sym typeface="Noteworthy Bold" charset="0"/>
+              </a:rPr>
+              <a:t>Laufzeit:</a:t>
+            </a:r>
+          </a:p>
+          <a:p>
+            <a:r>
+              <a:rPr lang="de-DE" sz="2800" kern="1200" dirty="0" smtClean="0">
+                <a:solidFill>
+                  <a:srgbClr val="572E2D"/>
+                </a:solidFill>
+                <a:latin typeface="Noteworthy Bold" charset="0"/>
+                <a:ea typeface="Noteworthy Bold" charset="0"/>
+                <a:cs typeface="Noteworthy Bold" charset="0"/>
+                <a:sym typeface="Noteworthy Bold" charset="0"/>
+              </a:rPr>
+              <a:t>Verantwortlich:</a:t>
+            </a:r>
+          </a:p>
+          <a:p>
+            <a:endParaRPr lang="de-DE" sz="2800" kern="1200" dirty="0" smtClean="0">
+              <a:solidFill>
+                <a:srgbClr val="572E2D"/>
+              </a:solidFill>
+              <a:latin typeface="Noteworthy Bold" charset="0"/>
+              <a:ea typeface="Noteworthy Bold" charset="0"/>
+              <a:cs typeface="Noteworthy Bold" charset="0"/>
+              <a:sym typeface="Noteworthy Bold" charset="0"/>
+            </a:endParaRPr>
+          </a:p>
+          <a:p>
+            <a:r>
+              <a:rPr lang="de-DE" sz="2800" kern="1200" dirty="0" smtClean="0">
+                <a:solidFill>
+                  <a:srgbClr val="572E2D"/>
+                </a:solidFill>
+                <a:latin typeface="Noteworthy Bold" charset="0"/>
+                <a:ea typeface="Noteworthy Bold" charset="0"/>
+                <a:cs typeface="Noteworthy Bold" charset="0"/>
+                <a:sym typeface="Noteworthy Bold" charset="0"/>
+              </a:rPr>
+              <a:t>--------------------------------</a:t>
+            </a:r>
+          </a:p>
+          <a:p>
+            <a:endParaRPr lang="de-DE" sz="2800" kern="1200" dirty="0" smtClean="0">
+              <a:solidFill>
+                <a:srgbClr val="572E2D"/>
+              </a:solidFill>
+              <a:latin typeface="Noteworthy Bold" charset="0"/>
+              <a:ea typeface="Noteworthy Bold" charset="0"/>
+              <a:cs typeface="Noteworthy Bold" charset="0"/>
+              <a:sym typeface="Noteworthy Bold" charset="0"/>
+            </a:endParaRPr>
+          </a:p>
+          <a:p>
+            <a:r>
+              <a:rPr lang="de-DE" sz="2800" kern="1200" dirty="0" smtClean="0">
+                <a:solidFill>
+                  <a:srgbClr val="572E2D"/>
+                </a:solidFill>
+                <a:latin typeface="Noteworthy Bold" charset="0"/>
+                <a:ea typeface="Noteworthy Bold" charset="0"/>
+                <a:cs typeface="Noteworthy Bold" charset="0"/>
+                <a:sym typeface="Noteworthy Bold" charset="0"/>
+              </a:rPr>
+              <a:t>Phasen: </a:t>
+            </a:r>
+          </a:p>
+          <a:p>
+            <a:r>
+              <a:rPr lang="de-DE" sz="2400" b="0" i="0" u="none" strike="noStrike" kern="1200" dirty="0" smtClean="0">
+                <a:solidFill>
+                  <a:srgbClr val="572E2D"/>
                 </a:solidFill>
                 <a:effectLst/>
-                <a:latin typeface="Gill Sans Light" charset="0"/>
-                <a:ea typeface="Gill Sans Light" charset="0"/>
-                <a:cs typeface="Gill Sans Light" charset="0"/>
-                <a:sym typeface="Gill Sans Light" charset="0"/>
-              </a:rPr>
-              <a:t>Projekt-Grafik</a:t>
-            </a:r>
-          </a:p>
-          <a:p>
-            <a:pPr marL="0" marR="0" indent="0" algn="l" defTabSz="457200" rtl="0" eaLnBrk="1" fontAlgn="base" latinLnBrk="0" hangingPunct="0">
-              <a:lnSpc>
-                <a:spcPts val="3500"/>
-              </a:lnSpc>
-              <a:spcBef>
-                <a:spcPct val="0"/>
-              </a:spcBef>
-              <a:spcAft>
-                <a:spcPct val="0"/>
-              </a:spcAft>
-              <a:buClrTx/>
-              <a:buSzTx/>
-              <a:buFontTx/>
-              <a:buNone/>
-              <a:tabLst/>
-              <a:defRPr/>
-            </a:pPr>
-            <a:r>
-              <a:rPr lang="de-DE" sz="3600" dirty="0" smtClean="0"/>
-              <a:t>Vergleich mit Vorlage</a:t>
-            </a:r>
-          </a:p>
-          <a:p>
-            <a:pPr marL="0" marR="0" indent="0" algn="l" defTabSz="457200" rtl="0" eaLnBrk="1" fontAlgn="base" latinLnBrk="0" hangingPunct="0">
-              <a:lnSpc>
-                <a:spcPts val="3500"/>
-              </a:lnSpc>
-              <a:spcBef>
-                <a:spcPct val="0"/>
-              </a:spcBef>
-              <a:spcAft>
-                <a:spcPct val="0"/>
-              </a:spcAft>
-              <a:buClrTx/>
-              <a:buSzTx/>
-              <a:buFontTx/>
-              <a:buNone/>
-              <a:tabLst/>
-              <a:defRPr/>
-            </a:pPr>
-            <a:r>
-              <a:rPr lang="de-DE" sz="4400" dirty="0" smtClean="0"/>
-              <a:t>Vergleich mit Beauftragung</a:t>
-            </a:r>
-          </a:p>
-          <a:p>
-            <a:pPr marL="0" marR="0" indent="0" algn="l" defTabSz="457200" rtl="0" eaLnBrk="1" fontAlgn="base" latinLnBrk="0" hangingPunct="0">
-              <a:lnSpc>
-                <a:spcPts val="3500"/>
-              </a:lnSpc>
-              <a:spcBef>
-                <a:spcPct val="0"/>
-              </a:spcBef>
-              <a:spcAft>
-                <a:spcPct val="0"/>
-              </a:spcAft>
-              <a:buClrTx/>
-              <a:buSzTx/>
-              <a:buFontTx/>
-              <a:buNone/>
-              <a:tabLst/>
-              <a:defRPr/>
-            </a:pPr>
-            <a:r>
-              <a:rPr lang="de-DE" sz="2400" kern="1200" dirty="0" smtClean="0">
-                <a:solidFill>
-                  <a:srgbClr val="572E2D"/>
-                </a:solidFill>
-                <a:latin typeface="Noteworthy Bold" charset="0"/>
-                <a:ea typeface="Noteworthy Bold" charset="0"/>
-                <a:cs typeface="Noteworthy Bold" charset="0"/>
-                <a:sym typeface="Noteworthy Bold" charset="0"/>
-              </a:rPr>
-              <a:t>Vergleich mit letztem Stand</a:t>
-            </a:r>
-            <a:endParaRPr kumimoji="0" lang="de-DE" sz="5400" b="0" i="0" u="none" strike="noStrike" cap="none" normalizeH="0" baseline="0" dirty="0" smtClean="0">
-              <a:ln>
-                <a:noFill/>
-              </a:ln>
+                <a:latin typeface="Noteworthy Bold" charset="0"/>
+                <a:ea typeface="Noteworthy Bold" charset="0"/>
+                <a:cs typeface="Noteworthy Bold" charset="0"/>
+                <a:sym typeface="Noteworthy Bold" charset="0"/>
+              </a:rPr>
+              <a:t>Business Case</a:t>
+            </a:r>
+            <a:endParaRPr lang="de-DE" sz="2800" dirty="0" smtClean="0"/>
+          </a:p>
+          <a:p>
+            <a:r>
+              <a:rPr lang="de-DE" sz="2400" b="0" i="0" u="none" strike="noStrike" kern="1200" dirty="0" smtClean="0">
+                <a:solidFill>
+                  <a:srgbClr val="572E2D"/>
+                </a:solidFill>
+                <a:effectLst/>
+                <a:latin typeface="Noteworthy Bold" charset="0"/>
+                <a:ea typeface="Noteworthy Bold" charset="0"/>
+                <a:cs typeface="Noteworthy Bold" charset="0"/>
+                <a:sym typeface="Noteworthy Bold" charset="0"/>
+              </a:rPr>
+              <a:t>Konzept</a:t>
+            </a:r>
+            <a:endParaRPr lang="de-DE" sz="2800" dirty="0" smtClean="0"/>
+          </a:p>
+          <a:p>
+            <a:r>
+              <a:rPr lang="de-DE" sz="2400" b="0" i="0" u="none" strike="noStrike" kern="1200" dirty="0" smtClean="0">
+                <a:solidFill>
+                  <a:srgbClr val="572E2D"/>
+                </a:solidFill>
+                <a:effectLst/>
+                <a:latin typeface="Noteworthy Bold" charset="0"/>
+                <a:ea typeface="Noteworthy Bold" charset="0"/>
+                <a:cs typeface="Noteworthy Bold" charset="0"/>
+                <a:sym typeface="Noteworthy Bold" charset="0"/>
+              </a:rPr>
+              <a:t>Entwicklung</a:t>
+            </a:r>
+            <a:endParaRPr lang="de-DE" sz="2800" dirty="0" smtClean="0"/>
+          </a:p>
+          <a:p>
+            <a:r>
+              <a:rPr lang="de-DE" sz="2400" b="0" i="0" u="none" strike="noStrike" kern="1200" dirty="0" smtClean="0">
+                <a:solidFill>
+                  <a:srgbClr val="572E2D"/>
+                </a:solidFill>
+                <a:effectLst/>
+                <a:latin typeface="Noteworthy Bold" charset="0"/>
+                <a:ea typeface="Noteworthy Bold" charset="0"/>
+                <a:cs typeface="Noteworthy Bold" charset="0"/>
+                <a:sym typeface="Noteworthy Bold" charset="0"/>
+              </a:rPr>
+              <a:t>Prototyp</a:t>
+            </a:r>
+            <a:endParaRPr lang="de-DE" sz="2800" dirty="0" smtClean="0"/>
+          </a:p>
+          <a:p>
+            <a:r>
+              <a:rPr lang="de-DE" sz="2400" b="0" i="0" u="none" strike="noStrike" kern="1200" dirty="0" smtClean="0">
+                <a:solidFill>
+                  <a:srgbClr val="572E2D"/>
+                </a:solidFill>
+                <a:effectLst/>
+                <a:latin typeface="Noteworthy Bold" charset="0"/>
+                <a:ea typeface="Noteworthy Bold" charset="0"/>
+                <a:cs typeface="Noteworthy Bold" charset="0"/>
+                <a:sym typeface="Noteworthy Bold" charset="0"/>
+              </a:rPr>
+              <a:t>Test</a:t>
+            </a:r>
+            <a:endParaRPr lang="de-DE" sz="2800" dirty="0" smtClean="0"/>
+          </a:p>
+          <a:p>
+            <a:r>
+              <a:rPr lang="de-DE" sz="2400" b="0" i="0" u="none" strike="noStrike" kern="1200" dirty="0" smtClean="0">
+                <a:solidFill>
+                  <a:srgbClr val="572E2D"/>
+                </a:solidFill>
+                <a:effectLst/>
+                <a:latin typeface="Noteworthy Bold" charset="0"/>
+                <a:ea typeface="Noteworthy Bold" charset="0"/>
+                <a:cs typeface="Noteworthy Bold" charset="0"/>
+                <a:sym typeface="Noteworthy Bold" charset="0"/>
+              </a:rPr>
+              <a:t>Rollout</a:t>
+            </a:r>
+          </a:p>
+          <a:p>
+            <a:endParaRPr lang="de-DE" sz="2400" b="0" i="0" u="none" strike="noStrike" kern="1200" dirty="0" smtClean="0">
               <a:solidFill>
-                <a:schemeClr val="bg2"/>
+                <a:srgbClr val="572E2D"/>
               </a:solidFill>
               <a:effectLst/>
-              <a:latin typeface="Gill Sans Light" charset="0"/>
-              <a:ea typeface="Gill Sans Light" charset="0"/>
-              <a:cs typeface="Gill Sans Light" charset="0"/>
-              <a:sym typeface="Gill Sans Light" charset="0"/>
+              <a:latin typeface="Noteworthy Bold" charset="0"/>
+              <a:sym typeface="Noteworthy Bold" charset="0"/>
             </a:endParaRPr>
           </a:p>
           <a:p>
-            <a:pPr marL="0" marR="0" indent="0" algn="l" defTabSz="457200" rtl="0" eaLnBrk="1" fontAlgn="base" latinLnBrk="0" hangingPunct="0">
-              <a:lnSpc>
-                <a:spcPts val="3500"/>
-              </a:lnSpc>
-              <a:spcBef>
-                <a:spcPct val="0"/>
-              </a:spcBef>
-              <a:spcAft>
-                <a:spcPct val="0"/>
-              </a:spcAft>
-              <a:buClrTx/>
-              <a:buSzTx/>
-              <a:buFontTx/>
-              <a:buNone/>
-              <a:tabLst/>
-              <a:defRPr/>
-            </a:pPr>
-            <a:endParaRPr kumimoji="0" lang="de-DE" sz="4400" b="0" i="0" u="none" strike="noStrike" cap="none" normalizeH="0" baseline="0" dirty="0" smtClean="0">
-              <a:ln>
-                <a:noFill/>
-              </a:ln>
+            <a:r>
+              <a:rPr lang="de-DE" sz="2400" b="0" i="0" u="none" strike="noStrike" kern="1200" dirty="0" smtClean="0">
+                <a:solidFill>
+                  <a:srgbClr val="572E2D"/>
+                </a:solidFill>
+                <a:effectLst/>
+                <a:latin typeface="Noteworthy Bold" charset="0"/>
+                <a:sym typeface="Noteworthy Bold" charset="0"/>
+              </a:rPr>
+              <a:t>Meilensteine: </a:t>
+            </a:r>
+          </a:p>
+          <a:p>
+            <a:r>
+              <a:rPr lang="de-DE" sz="2400" b="0" i="0" u="none" strike="noStrike" kern="1200" dirty="0" smtClean="0">
+                <a:solidFill>
+                  <a:srgbClr val="572E2D"/>
+                </a:solidFill>
+                <a:effectLst/>
+                <a:latin typeface="Noteworthy Bold" charset="0"/>
+                <a:ea typeface="Noteworthy Bold" charset="0"/>
+                <a:cs typeface="Noteworthy Bold" charset="0"/>
+                <a:sym typeface="Noteworthy Bold" charset="0"/>
+              </a:rPr>
+              <a:t>Projektskizze</a:t>
+            </a:r>
+          </a:p>
+          <a:p>
+            <a:r>
+              <a:rPr lang="de-DE" sz="2400" b="0" i="0" u="none" strike="noStrike" kern="1200" dirty="0" smtClean="0">
+                <a:solidFill>
+                  <a:srgbClr val="572E2D"/>
+                </a:solidFill>
+                <a:effectLst/>
+                <a:latin typeface="Noteworthy Bold" charset="0"/>
+                <a:ea typeface="Noteworthy Bold" charset="0"/>
+                <a:cs typeface="Noteworthy Bold" charset="0"/>
+                <a:sym typeface="Noteworthy Bold" charset="0"/>
+              </a:rPr>
+              <a:t>Kosten-/Nutzen Analyse</a:t>
+            </a:r>
+          </a:p>
+          <a:p>
+            <a:r>
+              <a:rPr lang="de-DE" sz="2400" b="0" i="0" u="none" strike="noStrike" kern="1200" dirty="0" smtClean="0">
+                <a:solidFill>
+                  <a:srgbClr val="572E2D"/>
+                </a:solidFill>
+                <a:effectLst/>
+                <a:latin typeface="Noteworthy Bold" charset="0"/>
+                <a:ea typeface="Noteworthy Bold" charset="0"/>
+                <a:cs typeface="Noteworthy Bold" charset="0"/>
+                <a:sym typeface="Noteworthy Bold" charset="0"/>
+              </a:rPr>
+              <a:t>Wettbewerbsanalyse</a:t>
+            </a:r>
+          </a:p>
+          <a:p>
+            <a:r>
+              <a:rPr lang="de-DE" sz="2400" b="0" i="0" u="none" strike="noStrike" kern="1200" dirty="0" smtClean="0">
+                <a:solidFill>
+                  <a:srgbClr val="572E2D"/>
+                </a:solidFill>
+                <a:effectLst/>
+                <a:latin typeface="Noteworthy Bold" charset="0"/>
+                <a:ea typeface="Noteworthy Bold" charset="0"/>
+                <a:cs typeface="Noteworthy Bold" charset="0"/>
+                <a:sym typeface="Noteworthy Bold" charset="0"/>
+              </a:rPr>
+              <a:t>Analyse Marktpotential</a:t>
+            </a:r>
+          </a:p>
+          <a:p>
+            <a:r>
+              <a:rPr lang="de-DE" sz="2400" b="0" i="0" u="none" strike="noStrike" kern="1200" dirty="0" smtClean="0">
+                <a:solidFill>
+                  <a:srgbClr val="572E2D"/>
+                </a:solidFill>
+                <a:effectLst/>
+                <a:latin typeface="Noteworthy Bold" charset="0"/>
+                <a:ea typeface="Noteworthy Bold" charset="0"/>
+                <a:cs typeface="Noteworthy Bold" charset="0"/>
+                <a:sym typeface="Noteworthy Bold" charset="0"/>
+              </a:rPr>
+              <a:t>Grob-Konzept</a:t>
+            </a:r>
+          </a:p>
+          <a:p>
+            <a:r>
+              <a:rPr lang="de-DE" sz="2400" b="0" i="0" u="none" strike="noStrike" kern="1200" dirty="0" smtClean="0">
+                <a:solidFill>
+                  <a:srgbClr val="572E2D"/>
+                </a:solidFill>
+                <a:effectLst/>
+                <a:latin typeface="Noteworthy Bold" charset="0"/>
+                <a:ea typeface="Noteworthy Bold" charset="0"/>
+                <a:cs typeface="Noteworthy Bold" charset="0"/>
+                <a:sym typeface="Noteworthy Bold" charset="0"/>
+              </a:rPr>
+              <a:t>Liste der erfolgskritischen Merkmale</a:t>
+            </a:r>
+          </a:p>
+          <a:p>
+            <a:r>
+              <a:rPr lang="de-DE" sz="2400" b="0" i="0" u="none" strike="noStrike" kern="1200" dirty="0" smtClean="0">
+                <a:solidFill>
+                  <a:srgbClr val="572E2D"/>
+                </a:solidFill>
+                <a:effectLst/>
+                <a:latin typeface="Noteworthy Bold" charset="0"/>
+                <a:ea typeface="Noteworthy Bold" charset="0"/>
+                <a:cs typeface="Noteworthy Bold" charset="0"/>
+                <a:sym typeface="Noteworthy Bold" charset="0"/>
+              </a:rPr>
+              <a:t>Anbieter Shortlist</a:t>
+            </a:r>
+          </a:p>
+          <a:p>
+            <a:r>
+              <a:rPr lang="de-DE" sz="2400" b="0" i="0" u="none" strike="noStrike" kern="1200" dirty="0" smtClean="0">
+                <a:solidFill>
+                  <a:srgbClr val="572E2D"/>
+                </a:solidFill>
+                <a:effectLst/>
+                <a:latin typeface="Noteworthy Bold" charset="0"/>
+                <a:ea typeface="Noteworthy Bold" charset="0"/>
+                <a:cs typeface="Noteworthy Bold" charset="0"/>
+                <a:sym typeface="Noteworthy Bold" charset="0"/>
+              </a:rPr>
+              <a:t>Benchmark Dokumentation</a:t>
+            </a:r>
+          </a:p>
+          <a:p>
+            <a:r>
+              <a:rPr lang="de-DE" sz="2400" b="0" i="0" u="none" strike="noStrike" kern="1200" dirty="0" smtClean="0">
+                <a:solidFill>
+                  <a:srgbClr val="572E2D"/>
+                </a:solidFill>
+                <a:effectLst/>
+                <a:latin typeface="Noteworthy Bold" charset="0"/>
+                <a:ea typeface="Noteworthy Bold" charset="0"/>
+                <a:cs typeface="Noteworthy Bold" charset="0"/>
+                <a:sym typeface="Noteworthy Bold" charset="0"/>
+              </a:rPr>
+              <a:t>Empfehlung Anbieter</a:t>
+            </a:r>
+          </a:p>
+          <a:p>
+            <a:r>
+              <a:rPr lang="de-DE" sz="2400" b="0" i="0" u="none" strike="noStrike" kern="1200" dirty="0" err="1" smtClean="0">
+                <a:solidFill>
+                  <a:srgbClr val="572E2D"/>
+                </a:solidFill>
+                <a:effectLst/>
+                <a:latin typeface="Noteworthy Bold" charset="0"/>
+                <a:ea typeface="Noteworthy Bold" charset="0"/>
+                <a:cs typeface="Noteworthy Bold" charset="0"/>
+                <a:sym typeface="Noteworthy Bold" charset="0"/>
+              </a:rPr>
+              <a:t>Use</a:t>
+            </a:r>
+            <a:r>
+              <a:rPr lang="de-DE" sz="2400" b="0" i="0" u="none" strike="noStrike" kern="1200" dirty="0" smtClean="0">
+                <a:solidFill>
+                  <a:srgbClr val="572E2D"/>
+                </a:solidFill>
+                <a:effectLst/>
+                <a:latin typeface="Noteworthy Bold" charset="0"/>
+                <a:ea typeface="Noteworthy Bold" charset="0"/>
+                <a:cs typeface="Noteworthy Bold" charset="0"/>
+                <a:sym typeface="Noteworthy Bold" charset="0"/>
+              </a:rPr>
+              <a:t> Cases</a:t>
+            </a:r>
+          </a:p>
+          <a:p>
+            <a:r>
+              <a:rPr lang="de-DE" sz="2400" b="0" i="0" u="none" strike="noStrike" kern="1200" dirty="0" smtClean="0">
+                <a:solidFill>
+                  <a:srgbClr val="572E2D"/>
+                </a:solidFill>
+                <a:effectLst/>
+                <a:latin typeface="Noteworthy Bold" charset="0"/>
+                <a:ea typeface="Noteworthy Bold" charset="0"/>
+                <a:cs typeface="Noteworthy Bold" charset="0"/>
+                <a:sym typeface="Noteworthy Bold" charset="0"/>
+              </a:rPr>
+              <a:t>Architektur Dokument</a:t>
+            </a:r>
+          </a:p>
+          <a:p>
+            <a:r>
+              <a:rPr lang="de-DE" sz="2400" b="0" i="0" u="none" strike="noStrike" kern="1200" dirty="0" smtClean="0">
+                <a:solidFill>
+                  <a:srgbClr val="572E2D"/>
+                </a:solidFill>
+                <a:effectLst/>
+                <a:latin typeface="Noteworthy Bold" charset="0"/>
+                <a:ea typeface="Noteworthy Bold" charset="0"/>
+                <a:cs typeface="Noteworthy Bold" charset="0"/>
+                <a:sym typeface="Noteworthy Bold" charset="0"/>
+              </a:rPr>
+              <a:t>Datenmodell</a:t>
+            </a:r>
+          </a:p>
+          <a:p>
+            <a:r>
+              <a:rPr lang="de-DE" sz="2400" b="0" i="0" u="none" strike="noStrike" kern="1200" dirty="0" smtClean="0">
+                <a:solidFill>
+                  <a:srgbClr val="572E2D"/>
+                </a:solidFill>
+                <a:effectLst/>
+                <a:latin typeface="Noteworthy Bold" charset="0"/>
+                <a:ea typeface="Noteworthy Bold" charset="0"/>
+                <a:cs typeface="Noteworthy Bold" charset="0"/>
+                <a:sym typeface="Noteworthy Bold" charset="0"/>
+              </a:rPr>
+              <a:t>Funktionsfähigkeit der erfolgskritischen Merkmale</a:t>
+            </a:r>
+          </a:p>
+          <a:p>
+            <a:r>
+              <a:rPr lang="de-DE" sz="2400" b="0" i="0" u="none" strike="noStrike" kern="1200" dirty="0" smtClean="0">
+                <a:solidFill>
+                  <a:srgbClr val="572E2D"/>
+                </a:solidFill>
+                <a:effectLst/>
+                <a:latin typeface="Noteworthy Bold" charset="0"/>
+                <a:ea typeface="Noteworthy Bold" charset="0"/>
+                <a:cs typeface="Noteworthy Bold" charset="0"/>
+                <a:sym typeface="Noteworthy Bold" charset="0"/>
+              </a:rPr>
+              <a:t>Testfall Dokumentation</a:t>
+            </a:r>
+          </a:p>
+          <a:p>
+            <a:r>
+              <a:rPr lang="de-DE" sz="2400" b="0" i="0" u="none" strike="noStrike" kern="1200" dirty="0" smtClean="0">
+                <a:solidFill>
+                  <a:srgbClr val="572E2D"/>
+                </a:solidFill>
+                <a:effectLst/>
+                <a:latin typeface="Noteworthy Bold" charset="0"/>
+                <a:ea typeface="Noteworthy Bold" charset="0"/>
+                <a:cs typeface="Noteworthy Bold" charset="0"/>
+                <a:sym typeface="Noteworthy Bold" charset="0"/>
+              </a:rPr>
+              <a:t>90% Muss-Testfälle erfolgreich</a:t>
+            </a:r>
+          </a:p>
+          <a:p>
+            <a:r>
+              <a:rPr lang="de-DE" sz="2400" b="0" i="0" u="none" strike="noStrike" kern="1200" dirty="0" smtClean="0">
+                <a:solidFill>
+                  <a:srgbClr val="572E2D"/>
+                </a:solidFill>
+                <a:effectLst/>
+                <a:latin typeface="Noteworthy Bold" charset="0"/>
+                <a:ea typeface="Noteworthy Bold" charset="0"/>
+                <a:cs typeface="Noteworthy Bold" charset="0"/>
+                <a:sym typeface="Noteworthy Bold" charset="0"/>
+              </a:rPr>
+              <a:t>Einführungsplan</a:t>
+            </a:r>
+            <a:r>
+              <a:rPr lang="de-DE" sz="3200" dirty="0" smtClean="0"/>
+              <a:t> </a:t>
+            </a:r>
+          </a:p>
+          <a:p>
+            <a:r>
+              <a:rPr lang="de-DE" sz="2400" b="0" i="0" u="none" strike="noStrike" kern="1200" dirty="0" smtClean="0">
+                <a:solidFill>
+                  <a:srgbClr val="572E2D"/>
+                </a:solidFill>
+                <a:effectLst/>
+                <a:latin typeface="Noteworthy Bold" charset="0"/>
+                <a:ea typeface="Noteworthy Bold" charset="0"/>
+                <a:cs typeface="Noteworthy Bold" charset="0"/>
+                <a:sym typeface="Noteworthy Bold" charset="0"/>
+              </a:rPr>
+              <a:t>70% Anwender-Abdeckung</a:t>
+            </a:r>
+            <a:r>
+              <a:rPr lang="de-DE" sz="3200" dirty="0" smtClean="0"/>
+              <a:t> </a:t>
+            </a:r>
+            <a:endParaRPr lang="de-DE" sz="2400" b="0" i="0" u="none" strike="noStrike" kern="1200" dirty="0" smtClean="0">
               <a:solidFill>
-                <a:schemeClr val="bg2"/>
+                <a:srgbClr val="572E2D"/>
               </a:solidFill>
               <a:effectLst/>
-              <a:latin typeface="Gill Sans Light" charset="0"/>
-              <a:ea typeface="Gill Sans Light" charset="0"/>
-              <a:cs typeface="Gill Sans Light" charset="0"/>
-              <a:sym typeface="Gill Sans Light" charset="0"/>
+              <a:latin typeface="Noteworthy Bold" charset="0"/>
+              <a:sym typeface="Noteworthy Bold" charset="0"/>
             </a:endParaRPr>
           </a:p>
           <a:p>
-            <a:pPr marL="0" marR="0" indent="0" algn="l" defTabSz="457200" rtl="0" eaLnBrk="1" fontAlgn="base" latinLnBrk="0" hangingPunct="0">
-              <a:lnSpc>
-                <a:spcPts val="3500"/>
-              </a:lnSpc>
-              <a:spcBef>
-                <a:spcPct val="0"/>
-              </a:spcBef>
-              <a:spcAft>
-                <a:spcPct val="0"/>
-              </a:spcAft>
-              <a:buClrTx/>
-              <a:buSzTx/>
-              <a:buFontTx/>
-              <a:buNone/>
-              <a:tabLst/>
-              <a:defRPr/>
-            </a:pPr>
-            <a:endParaRPr kumimoji="0" lang="de-DE" sz="3600" b="0" i="0" u="none" strike="noStrike" cap="none" normalizeH="0" baseline="0" dirty="0" smtClean="0">
-              <a:ln>
-                <a:noFill/>
-              </a:ln>
+            <a:endParaRPr lang="de-DE" sz="2400" b="0" i="0" u="none" strike="noStrike" kern="1200" dirty="0" smtClean="0">
               <a:solidFill>
-                <a:schemeClr val="bg2"/>
+                <a:srgbClr val="572E2D"/>
               </a:solidFill>
               <a:effectLst/>
-              <a:latin typeface="Gill Sans Light" charset="0"/>
-              <a:ea typeface="Gill Sans Light" charset="0"/>
-              <a:cs typeface="Gill Sans Light" charset="0"/>
-              <a:sym typeface="Gill Sans Light" charset="0"/>
+              <a:latin typeface="Noteworthy Bold" charset="0"/>
+              <a:sym typeface="Noteworthy Bold" charset="0"/>
             </a:endParaRPr>
           </a:p>
           <a:p>
-            <a:endParaRPr lang="de-DE" sz="2500" dirty="0" smtClean="0"/>
-          </a:p>
-          <a:p>
-            <a:r>
-              <a:rPr lang="de-DE" sz="2500" dirty="0" smtClean="0"/>
-              <a:t>Tabelle Projektziele</a:t>
-            </a:r>
-          </a:p>
-          <a:p>
-            <a:r>
-              <a:rPr lang="de-DE" sz="2400" kern="1200" dirty="0" smtClean="0">
-                <a:solidFill>
-                  <a:srgbClr val="572E2D"/>
-                </a:solidFill>
-                <a:latin typeface="Noteworthy Bold" charset="0"/>
-                <a:ea typeface="Noteworthy Bold" charset="0"/>
-                <a:cs typeface="Noteworthy Bold" charset="0"/>
-                <a:sym typeface="Noteworthy Bold" charset="0"/>
-              </a:rPr>
-              <a:t>Tabelle Projektstatus</a:t>
-            </a:r>
-          </a:p>
-          <a:p>
-            <a:r>
-              <a:rPr lang="de-DE" sz="2400" kern="1200" dirty="0" smtClean="0">
-                <a:solidFill>
-                  <a:srgbClr val="572E2D"/>
-                </a:solidFill>
-                <a:latin typeface="Noteworthy Bold" charset="0"/>
-                <a:ea typeface="Noteworthy Bold" charset="0"/>
-                <a:cs typeface="Noteworthy Bold" charset="0"/>
-                <a:sym typeface="Noteworthy Bold" charset="0"/>
-              </a:rPr>
-              <a:t>Tabelle Veränderungen</a:t>
-            </a:r>
-            <a:endParaRPr lang="de-DE" sz="2500" dirty="0" smtClean="0"/>
-          </a:p>
-          <a:p>
-            <a:r>
-              <a:rPr lang="de-DE" sz="2500" dirty="0" smtClean="0"/>
-              <a:t>Tabelle Vergleich letzter Stand</a:t>
-            </a:r>
-          </a:p>
-          <a:p>
-            <a:r>
-              <a:rPr lang="de-DE" sz="2500" dirty="0" smtClean="0"/>
-              <a:t>Tabelle Vergleich Beauftragung</a:t>
-            </a:r>
-          </a:p>
-          <a:p>
-            <a:endParaRPr lang="de-DE" sz="2500" dirty="0" smtClean="0"/>
-          </a:p>
-          <a:p>
-            <a:pPr marL="0" marR="0" indent="0" algn="l" defTabSz="457200" rtl="0" eaLnBrk="1" fontAlgn="base" latinLnBrk="0" hangingPunct="0">
-              <a:lnSpc>
-                <a:spcPts val="3500"/>
-              </a:lnSpc>
-              <a:spcBef>
-                <a:spcPct val="0"/>
-              </a:spcBef>
-              <a:spcAft>
-                <a:spcPct val="0"/>
-              </a:spcAft>
-              <a:buClrTx/>
-              <a:buSzTx/>
-              <a:buFontTx/>
-              <a:buNone/>
-              <a:tabLst/>
-              <a:defRPr/>
-            </a:pPr>
-            <a:r>
-              <a:rPr lang="de-DE" sz="2800" dirty="0" smtClean="0"/>
-              <a:t>Meilenstein Trendanalyse(..)</a:t>
-            </a:r>
-          </a:p>
-          <a:p>
-            <a:pPr marL="0" marR="0" indent="0" algn="l" defTabSz="457200" rtl="0" eaLnBrk="1" fontAlgn="base" latinLnBrk="0" hangingPunct="0">
-              <a:lnSpc>
-                <a:spcPts val="3500"/>
-              </a:lnSpc>
-              <a:spcBef>
-                <a:spcPct val="0"/>
-              </a:spcBef>
-              <a:spcAft>
-                <a:spcPct val="0"/>
-              </a:spcAft>
-              <a:buClrTx/>
-              <a:buSzTx/>
-              <a:buFontTx/>
-              <a:buNone/>
-              <a:tabLst/>
-              <a:defRPr/>
-            </a:pPr>
-            <a:r>
-              <a:rPr lang="de-DE" sz="2400" kern="1200" dirty="0" smtClean="0">
-                <a:solidFill>
-                  <a:srgbClr val="572E2D"/>
-                </a:solidFill>
-                <a:latin typeface="Noteworthy Bold" charset="0"/>
-                <a:ea typeface="Noteworthy Bold" charset="0"/>
-                <a:cs typeface="Noteworthy Bold" charset="0"/>
-                <a:sym typeface="Noteworthy Bold" charset="0"/>
-              </a:rPr>
-              <a:t>Trend Strategischer Fit/Risiko</a:t>
-            </a:r>
-          </a:p>
-          <a:p>
-            <a:pPr marL="0" marR="0" indent="0" algn="l" defTabSz="457200" rtl="0" eaLnBrk="1" fontAlgn="base" latinLnBrk="0" hangingPunct="0">
-              <a:lnSpc>
-                <a:spcPts val="3500"/>
-              </a:lnSpc>
-              <a:spcBef>
-                <a:spcPct val="0"/>
-              </a:spcBef>
-              <a:spcAft>
-                <a:spcPct val="0"/>
-              </a:spcAft>
-              <a:buClrTx/>
-              <a:buSzTx/>
-              <a:buFontTx/>
-              <a:buNone/>
-              <a:tabLst/>
-              <a:defRPr/>
-            </a:pPr>
-            <a:r>
-              <a:rPr lang="de-DE" sz="2400" kern="1200" dirty="0" smtClean="0">
-                <a:solidFill>
-                  <a:srgbClr val="572E2D"/>
-                </a:solidFill>
-                <a:latin typeface="Noteworthy Bold" charset="0"/>
-                <a:ea typeface="Noteworthy Bold" charset="0"/>
-                <a:cs typeface="Noteworthy Bold" charset="0"/>
-                <a:sym typeface="Noteworthy Bold" charset="0"/>
-              </a:rPr>
-              <a:t>Trend Kennzahlen</a:t>
-            </a:r>
-            <a:endParaRPr kumimoji="0" lang="de-DE" sz="3600" b="0" i="0" u="none" strike="noStrike" cap="none" normalizeH="0" baseline="0" dirty="0" smtClean="0">
-              <a:ln>
-                <a:noFill/>
-              </a:ln>
+            <a:r>
+              <a:rPr lang="de-DE" sz="2400" b="0" i="0" u="none" strike="noStrike" kern="1200" dirty="0" smtClean="0">
+                <a:solidFill>
+                  <a:srgbClr val="572E2D"/>
+                </a:solidFill>
+                <a:effectLst/>
+                <a:latin typeface="Noteworthy Bold" charset="0"/>
+                <a:sym typeface="Noteworthy Bold" charset="0"/>
+              </a:rPr>
+              <a:t>Rollen: </a:t>
+            </a:r>
+          </a:p>
+          <a:p>
+            <a:r>
+              <a:rPr lang="de-DE" sz="2400" b="0" i="0" u="none" strike="noStrike" kern="1200" dirty="0" smtClean="0">
+                <a:solidFill>
+                  <a:srgbClr val="572E2D"/>
+                </a:solidFill>
+                <a:effectLst/>
+                <a:latin typeface="Noteworthy Bold" charset="0"/>
+                <a:ea typeface="Noteworthy Bold" charset="0"/>
+                <a:cs typeface="Noteworthy Bold" charset="0"/>
+                <a:sym typeface="Noteworthy Bold" charset="0"/>
+              </a:rPr>
+              <a:t>Projektleiter</a:t>
+            </a:r>
+            <a:endParaRPr lang="de-DE" sz="3200" dirty="0" smtClean="0"/>
+          </a:p>
+          <a:p>
+            <a:r>
+              <a:rPr lang="de-DE" sz="2400" b="0" i="0" u="none" strike="noStrike" kern="1200" dirty="0" smtClean="0">
+                <a:solidFill>
+                  <a:srgbClr val="572E2D"/>
+                </a:solidFill>
+                <a:effectLst/>
+                <a:latin typeface="Noteworthy Bold" charset="0"/>
+                <a:ea typeface="Noteworthy Bold" charset="0"/>
+                <a:cs typeface="Noteworthy Bold" charset="0"/>
+                <a:sym typeface="Noteworthy Bold" charset="0"/>
+              </a:rPr>
+              <a:t>GUI Spezialist</a:t>
+            </a:r>
+            <a:endParaRPr lang="de-DE" sz="3200" dirty="0" smtClean="0"/>
+          </a:p>
+          <a:p>
+            <a:r>
+              <a:rPr lang="de-DE" sz="2400" b="0" i="0" u="none" strike="noStrike" kern="1200" dirty="0" smtClean="0">
+                <a:solidFill>
+                  <a:srgbClr val="572E2D"/>
+                </a:solidFill>
+                <a:effectLst/>
+                <a:latin typeface="Noteworthy Bold" charset="0"/>
+                <a:ea typeface="Noteworthy Bold" charset="0"/>
+                <a:cs typeface="Noteworthy Bold" charset="0"/>
+                <a:sym typeface="Noteworthy Bold" charset="0"/>
+              </a:rPr>
+              <a:t>Analyst</a:t>
+            </a:r>
+            <a:r>
+              <a:rPr lang="de-DE" sz="3200" dirty="0" smtClean="0"/>
+              <a:t> </a:t>
+            </a:r>
+            <a:r>
+              <a:rPr lang="de-DE" sz="2400" b="0" i="0" u="none" strike="noStrike" kern="1200" dirty="0" smtClean="0">
+                <a:solidFill>
+                  <a:srgbClr val="572E2D"/>
+                </a:solidFill>
+                <a:effectLst/>
+                <a:latin typeface="Noteworthy Bold" charset="0"/>
+                <a:ea typeface="Noteworthy Bold" charset="0"/>
+                <a:cs typeface="Noteworthy Bold" charset="0"/>
+                <a:sym typeface="Noteworthy Bold" charset="0"/>
+              </a:rPr>
+              <a:t>Architekt</a:t>
+            </a:r>
+            <a:endParaRPr lang="de-DE" sz="3200" dirty="0" smtClean="0"/>
+          </a:p>
+          <a:p>
+            <a:r>
+              <a:rPr lang="de-DE" sz="2400" b="0" i="0" u="none" strike="noStrike" kern="1200" dirty="0" smtClean="0">
+                <a:solidFill>
+                  <a:srgbClr val="572E2D"/>
+                </a:solidFill>
+                <a:effectLst/>
+                <a:latin typeface="Noteworthy Bold" charset="0"/>
+                <a:ea typeface="Noteworthy Bold" charset="0"/>
+                <a:cs typeface="Noteworthy Bold" charset="0"/>
+                <a:sym typeface="Noteworthy Bold" charset="0"/>
+              </a:rPr>
+              <a:t>Entwickler</a:t>
+            </a:r>
+            <a:endParaRPr lang="de-DE" sz="3200" dirty="0" smtClean="0"/>
+          </a:p>
+          <a:p>
+            <a:r>
+              <a:rPr lang="de-DE" sz="2400" b="0" i="0" u="none" strike="noStrike" kern="1200" dirty="0" smtClean="0">
+                <a:solidFill>
+                  <a:srgbClr val="572E2D"/>
+                </a:solidFill>
+                <a:effectLst/>
+                <a:latin typeface="Noteworthy Bold" charset="0"/>
+                <a:ea typeface="Noteworthy Bold" charset="0"/>
+                <a:cs typeface="Noteworthy Bold" charset="0"/>
+                <a:sym typeface="Noteworthy Bold" charset="0"/>
+              </a:rPr>
+              <a:t>Tester</a:t>
+            </a:r>
+            <a:endParaRPr lang="de-DE" sz="2400" b="0" i="0" u="none" strike="noStrike" kern="1200" dirty="0" smtClean="0">
               <a:solidFill>
-                <a:schemeClr val="bg2"/>
+                <a:srgbClr val="572E2D"/>
               </a:solidFill>
               <a:effectLst/>
-              <a:latin typeface="Gill Sans Light" charset="0"/>
-              <a:ea typeface="Gill Sans Light" charset="0"/>
-              <a:cs typeface="Gill Sans Light" charset="0"/>
-              <a:sym typeface="Gill Sans Light" charset="0"/>
+              <a:latin typeface="Noteworthy Bold" charset="0"/>
+              <a:sym typeface="Noteworthy Bold" charset="0"/>
             </a:endParaRPr>
           </a:p>
           <a:p>
-            <a:endParaRPr lang="de-DE" sz="2500" dirty="0" smtClean="0"/>
-          </a:p>
-          <a:p>
-            <a:endParaRPr lang="de-DE" sz="2500" dirty="0" smtClean="0"/>
-          </a:p>
-          <a:p>
-            <a:r>
-              <a:rPr lang="de-DE" sz="2500" dirty="0" smtClean="0"/>
-              <a:t>Fortschritt Personalkosten</a:t>
-            </a:r>
-          </a:p>
-          <a:p>
-            <a:r>
-              <a:rPr lang="de-DE" sz="2500" dirty="0" smtClean="0"/>
-              <a:t>Fortschritt Sonstige Kosten</a:t>
-            </a:r>
-          </a:p>
-          <a:p>
-            <a:r>
-              <a:rPr lang="de-DE" sz="2500" dirty="0" smtClean="0"/>
-              <a:t>Fortschritt Gesamtkosten</a:t>
-            </a:r>
-          </a:p>
-          <a:p>
-            <a:r>
-              <a:rPr lang="de-DE" sz="2500" dirty="0" smtClean="0"/>
-              <a:t>Fortschritt Rolle(…)</a:t>
-            </a:r>
-          </a:p>
-          <a:p>
-            <a:r>
-              <a:rPr lang="de-DE" sz="2500" dirty="0" smtClean="0"/>
-              <a:t>Fortschritt Kostenart(…)</a:t>
-            </a:r>
-          </a:p>
-          <a:p>
-            <a:endParaRPr lang="de-DE" sz="2500" dirty="0" smtClean="0"/>
-          </a:p>
-          <a:p>
-            <a:r>
-              <a:rPr lang="de-DE" sz="2400" kern="1200" dirty="0" smtClean="0">
-                <a:solidFill>
-                  <a:srgbClr val="572E2D"/>
-                </a:solidFill>
-                <a:latin typeface="Noteworthy Bold" charset="0"/>
-                <a:ea typeface="Noteworthy Bold" charset="0"/>
-                <a:cs typeface="Noteworthy Bold" charset="0"/>
-                <a:sym typeface="Noteworthy Bold" charset="0"/>
-              </a:rPr>
-              <a:t>Soll-Ist &amp; Prognose</a:t>
-            </a:r>
-            <a:endParaRPr lang="de-DE" sz="2500" dirty="0" smtClean="0"/>
-          </a:p>
-          <a:p>
-            <a:endParaRPr lang="de-DE" sz="2500" dirty="0" smtClean="0"/>
-          </a:p>
-          <a:p>
-            <a:r>
-              <a:rPr lang="de-DE" sz="2500" dirty="0" smtClean="0"/>
-              <a:t>Soll-Ist1 Personalkosten</a:t>
-            </a:r>
-          </a:p>
-          <a:p>
-            <a:pPr defTabSz="481706">
-              <a:lnSpc>
-                <a:spcPts val="3688"/>
-              </a:lnSpc>
-              <a:defRPr/>
-            </a:pPr>
-            <a:r>
-              <a:rPr lang="de-DE" sz="2500" dirty="0" smtClean="0"/>
-              <a:t>Soll-Ist2 Personalkosten</a:t>
-            </a:r>
-          </a:p>
-          <a:p>
-            <a:endParaRPr lang="de-DE" sz="2500" dirty="0" smtClean="0"/>
-          </a:p>
-          <a:p>
-            <a:r>
-              <a:rPr lang="de-DE" sz="2500" dirty="0" smtClean="0"/>
-              <a:t>Soll-Ist1 Sonstige Kosten</a:t>
-            </a:r>
-          </a:p>
-          <a:p>
-            <a:pPr defTabSz="481706">
-              <a:lnSpc>
-                <a:spcPts val="3688"/>
-              </a:lnSpc>
-              <a:defRPr/>
-            </a:pPr>
-            <a:r>
-              <a:rPr lang="de-DE" sz="2500" dirty="0" smtClean="0"/>
-              <a:t>Soll-Ist2 Sonstige Kosten</a:t>
-            </a:r>
-          </a:p>
-          <a:p>
-            <a:endParaRPr lang="de-DE" sz="2500" dirty="0" smtClean="0"/>
-          </a:p>
-          <a:p>
-            <a:r>
-              <a:rPr lang="de-DE" sz="2500" dirty="0" smtClean="0"/>
-              <a:t>Soll-Ist1 Gesamtkosten</a:t>
-            </a:r>
-          </a:p>
-          <a:p>
-            <a:pPr defTabSz="481706">
-              <a:lnSpc>
-                <a:spcPts val="3688"/>
-              </a:lnSpc>
-              <a:defRPr/>
-            </a:pPr>
-            <a:r>
-              <a:rPr lang="de-DE" sz="2500" dirty="0" smtClean="0"/>
-              <a:t>Soll-Ist2 Gesamtkosten</a:t>
-            </a:r>
-          </a:p>
-          <a:p>
-            <a:endParaRPr lang="de-DE" sz="2500" dirty="0" smtClean="0"/>
-          </a:p>
-          <a:p>
-            <a:r>
-              <a:rPr lang="de-DE" sz="2500" dirty="0" smtClean="0"/>
-              <a:t>Soll-Ist1 Rolle (…)</a:t>
-            </a:r>
-          </a:p>
-          <a:p>
-            <a:pPr defTabSz="481706">
-              <a:lnSpc>
-                <a:spcPts val="3688"/>
-              </a:lnSpc>
-              <a:defRPr/>
-            </a:pPr>
-            <a:r>
-              <a:rPr lang="de-DE" sz="2500" dirty="0" smtClean="0"/>
-              <a:t>Soll-Ist2 Rolle (…)</a:t>
-            </a:r>
-          </a:p>
-          <a:p>
-            <a:endParaRPr lang="de-DE" sz="2500" dirty="0" smtClean="0"/>
-          </a:p>
-          <a:p>
-            <a:r>
-              <a:rPr lang="de-DE" sz="2500" dirty="0" smtClean="0"/>
-              <a:t>Soll-Ist1 Kostenart (…)</a:t>
-            </a:r>
-          </a:p>
-          <a:p>
-            <a:pPr defTabSz="481706">
-              <a:lnSpc>
-                <a:spcPts val="3688"/>
-              </a:lnSpc>
-              <a:defRPr/>
-            </a:pPr>
-            <a:r>
-              <a:rPr lang="de-DE" sz="2500" dirty="0" smtClean="0"/>
-              <a:t>Soll-Ist2 Kostenart (…)</a:t>
-            </a:r>
-          </a:p>
-          <a:p>
-            <a:endParaRPr lang="de-DE" sz="2500" dirty="0" smtClean="0"/>
-          </a:p>
-          <a:p>
-            <a:r>
-              <a:rPr lang="de-DE" sz="2500" dirty="0" smtClean="0"/>
-              <a:t>Ampel-Farbe</a:t>
-            </a:r>
-          </a:p>
-          <a:p>
-            <a:r>
-              <a:rPr lang="de-DE" sz="2500" dirty="0" smtClean="0"/>
-              <a:t>Beschreibung</a:t>
-            </a:r>
-          </a:p>
-          <a:p>
-            <a:r>
-              <a:rPr lang="de-DE" sz="2500" dirty="0" smtClean="0"/>
-              <a:t>Stand:</a:t>
-            </a:r>
-          </a:p>
-          <a:p>
-            <a:r>
-              <a:rPr lang="de-DE" sz="2500" dirty="0" smtClean="0"/>
-              <a:t>Laufzeit:</a:t>
-            </a:r>
-          </a:p>
-          <a:p>
-            <a:r>
-              <a:rPr lang="de-DE" sz="2500" dirty="0" smtClean="0"/>
-              <a:t>Verantwortlich:</a:t>
-            </a:r>
-            <a:endParaRPr lang="de-DE" sz="2800" dirty="0"/>
+            <a:endParaRPr lang="de-DE" sz="2400" b="0" i="0" u="none" strike="noStrike" kern="1200" dirty="0" smtClean="0">
+              <a:solidFill>
+                <a:srgbClr val="572E2D"/>
+              </a:solidFill>
+              <a:effectLst/>
+              <a:latin typeface="Noteworthy Bold" charset="0"/>
+              <a:sym typeface="Noteworthy Bold" charset="0"/>
+            </a:endParaRPr>
+          </a:p>
+          <a:p>
+            <a:r>
+              <a:rPr lang="de-DE" sz="2400" b="0" i="0" u="none" strike="noStrike" kern="1200" dirty="0" smtClean="0">
+                <a:solidFill>
+                  <a:srgbClr val="572E2D"/>
+                </a:solidFill>
+                <a:effectLst/>
+                <a:latin typeface="Noteworthy Bold" charset="0"/>
+                <a:sym typeface="Noteworthy Bold" charset="0"/>
+              </a:rPr>
+              <a:t>Kostenarten: </a:t>
+            </a:r>
+          </a:p>
+          <a:p>
+            <a:r>
+              <a:rPr lang="de-DE" sz="2400" b="0" i="0" u="none" strike="noStrike" kern="1200" dirty="0" smtClean="0">
+                <a:solidFill>
+                  <a:srgbClr val="572E2D"/>
+                </a:solidFill>
+                <a:effectLst/>
+                <a:latin typeface="Noteworthy Bold" charset="0"/>
+                <a:ea typeface="Noteworthy Bold" charset="0"/>
+                <a:cs typeface="Noteworthy Bold" charset="0"/>
+                <a:sym typeface="Noteworthy Bold" charset="0"/>
+              </a:rPr>
+              <a:t>IT-Kosten</a:t>
+            </a:r>
+            <a:endParaRPr lang="de-DE" sz="3200" dirty="0" smtClean="0"/>
+          </a:p>
+          <a:p>
+            <a:r>
+              <a:rPr lang="de-DE" sz="2400" b="0" i="0" u="none" strike="noStrike" kern="1200" dirty="0" smtClean="0">
+                <a:solidFill>
+                  <a:srgbClr val="572E2D"/>
+                </a:solidFill>
+                <a:effectLst/>
+                <a:latin typeface="Noteworthy Bold" charset="0"/>
+                <a:ea typeface="Noteworthy Bold" charset="0"/>
+                <a:cs typeface="Noteworthy Bold" charset="0"/>
+                <a:sym typeface="Noteworthy Bold" charset="0"/>
+              </a:rPr>
+              <a:t>Reise-Kosten</a:t>
+            </a:r>
+          </a:p>
+          <a:p>
+            <a:r>
+              <a:rPr lang="de-DE" sz="2400" b="0" i="0" u="none" strike="noStrike" kern="1200" dirty="0" smtClean="0">
+                <a:solidFill>
+                  <a:srgbClr val="572E2D"/>
+                </a:solidFill>
+                <a:effectLst/>
+                <a:latin typeface="Noteworthy Bold" charset="0"/>
+                <a:ea typeface="Noteworthy Bold" charset="0"/>
+                <a:cs typeface="Noteworthy Bold" charset="0"/>
+                <a:sym typeface="Noteworthy Bold" charset="0"/>
+              </a:rPr>
+              <a:t>Trainings-Kosten</a:t>
+            </a:r>
+            <a:r>
+              <a:rPr lang="de-DE" sz="3200" dirty="0" smtClean="0"/>
+              <a:t> </a:t>
+            </a:r>
+            <a:endParaRPr lang="de-DE" sz="2400" b="0" i="0" u="none" strike="noStrike" kern="1200" dirty="0" smtClean="0">
+              <a:solidFill>
+                <a:srgbClr val="572E2D"/>
+              </a:solidFill>
+              <a:effectLst/>
+              <a:latin typeface="Noteworthy Bold" charset="0"/>
+              <a:sym typeface="Noteworthy Bold" charset="0"/>
+            </a:endParaRPr>
+          </a:p>
+          <a:p>
+            <a:r>
+              <a:rPr lang="de-DE" sz="2800" smtClean="0"/>
+              <a:t> </a:t>
+            </a:r>
+            <a:endParaRPr lang="de-DE" sz="2800" kern="1200" dirty="0" smtClean="0">
+              <a:solidFill>
+                <a:srgbClr val="572E2D"/>
+              </a:solidFill>
+              <a:latin typeface="Noteworthy Bold" charset="0"/>
+              <a:ea typeface="Noteworthy Bold" charset="0"/>
+              <a:cs typeface="Noteworthy Bold" charset="0"/>
+              <a:sym typeface="Noteworthy Bold" charset="0"/>
+            </a:endParaRPr>
           </a:p>
         </p:txBody>
       </p:sp>

</xml_diff>